<commit_message>
Atualização dos arquivos básicos, dia 28/05/2020
</commit_message>
<xml_diff>
--- a/StepByStep.pptx
+++ b/StepByStep.pptx
@@ -248,7 +248,7 @@
           <a:p>
             <a:fld id="{E13DAF52-12CB-49C3-A02E-B91863304E30}" type="datetimeFigureOut">
               <a:rPr lang="pt-BR" smtClean="0"/>
-              <a:t>27/05/2020</a:t>
+              <a:t>28/05/2020</a:t>
             </a:fld>
             <a:endParaRPr lang="pt-BR"/>
           </a:p>
@@ -416,7 +416,7 @@
           <a:p>
             <a:fld id="{E13DAF52-12CB-49C3-A02E-B91863304E30}" type="datetimeFigureOut">
               <a:rPr lang="pt-BR" smtClean="0"/>
-              <a:t>27/05/2020</a:t>
+              <a:t>28/05/2020</a:t>
             </a:fld>
             <a:endParaRPr lang="pt-BR"/>
           </a:p>
@@ -594,7 +594,7 @@
           <a:p>
             <a:fld id="{E13DAF52-12CB-49C3-A02E-B91863304E30}" type="datetimeFigureOut">
               <a:rPr lang="pt-BR" smtClean="0"/>
-              <a:t>27/05/2020</a:t>
+              <a:t>28/05/2020</a:t>
             </a:fld>
             <a:endParaRPr lang="pt-BR"/>
           </a:p>
@@ -762,7 +762,7 @@
           <a:p>
             <a:fld id="{E13DAF52-12CB-49C3-A02E-B91863304E30}" type="datetimeFigureOut">
               <a:rPr lang="pt-BR" smtClean="0"/>
-              <a:t>27/05/2020</a:t>
+              <a:t>28/05/2020</a:t>
             </a:fld>
             <a:endParaRPr lang="pt-BR"/>
           </a:p>
@@ -1007,7 +1007,7 @@
           <a:p>
             <a:fld id="{E13DAF52-12CB-49C3-A02E-B91863304E30}" type="datetimeFigureOut">
               <a:rPr lang="pt-BR" smtClean="0"/>
-              <a:t>27/05/2020</a:t>
+              <a:t>28/05/2020</a:t>
             </a:fld>
             <a:endParaRPr lang="pt-BR"/>
           </a:p>
@@ -1236,7 +1236,7 @@
           <a:p>
             <a:fld id="{E13DAF52-12CB-49C3-A02E-B91863304E30}" type="datetimeFigureOut">
               <a:rPr lang="pt-BR" smtClean="0"/>
-              <a:t>27/05/2020</a:t>
+              <a:t>28/05/2020</a:t>
             </a:fld>
             <a:endParaRPr lang="pt-BR"/>
           </a:p>
@@ -1600,7 +1600,7 @@
           <a:p>
             <a:fld id="{E13DAF52-12CB-49C3-A02E-B91863304E30}" type="datetimeFigureOut">
               <a:rPr lang="pt-BR" smtClean="0"/>
-              <a:t>27/05/2020</a:t>
+              <a:t>28/05/2020</a:t>
             </a:fld>
             <a:endParaRPr lang="pt-BR"/>
           </a:p>
@@ -1717,7 +1717,7 @@
           <a:p>
             <a:fld id="{E13DAF52-12CB-49C3-A02E-B91863304E30}" type="datetimeFigureOut">
               <a:rPr lang="pt-BR" smtClean="0"/>
-              <a:t>27/05/2020</a:t>
+              <a:t>28/05/2020</a:t>
             </a:fld>
             <a:endParaRPr lang="pt-BR"/>
           </a:p>
@@ -1812,7 +1812,7 @@
           <a:p>
             <a:fld id="{E13DAF52-12CB-49C3-A02E-B91863304E30}" type="datetimeFigureOut">
               <a:rPr lang="pt-BR" smtClean="0"/>
-              <a:t>27/05/2020</a:t>
+              <a:t>28/05/2020</a:t>
             </a:fld>
             <a:endParaRPr lang="pt-BR"/>
           </a:p>
@@ -2087,7 +2087,7 @@
           <a:p>
             <a:fld id="{E13DAF52-12CB-49C3-A02E-B91863304E30}" type="datetimeFigureOut">
               <a:rPr lang="pt-BR" smtClean="0"/>
-              <a:t>27/05/2020</a:t>
+              <a:t>28/05/2020</a:t>
             </a:fld>
             <a:endParaRPr lang="pt-BR"/>
           </a:p>
@@ -2339,7 +2339,7 @@
           <a:p>
             <a:fld id="{E13DAF52-12CB-49C3-A02E-B91863304E30}" type="datetimeFigureOut">
               <a:rPr lang="pt-BR" smtClean="0"/>
-              <a:t>27/05/2020</a:t>
+              <a:t>28/05/2020</a:t>
             </a:fld>
             <a:endParaRPr lang="pt-BR"/>
           </a:p>
@@ -2550,7 +2550,7 @@
           <a:p>
             <a:fld id="{E13DAF52-12CB-49C3-A02E-B91863304E30}" type="datetimeFigureOut">
               <a:rPr lang="pt-BR" smtClean="0"/>
-              <a:t>27/05/2020</a:t>
+              <a:t>28/05/2020</a:t>
             </a:fld>
             <a:endParaRPr lang="pt-BR"/>
           </a:p>
@@ -2998,8 +2998,8 @@
         </p:nvSpPr>
         <p:spPr>
           <a:xfrm>
-            <a:off x="1592580" y="4390708"/>
-            <a:ext cx="9144000" cy="1655762"/>
+            <a:off x="1274618" y="4390708"/>
+            <a:ext cx="9461962" cy="1655762"/>
           </a:xfrm>
         </p:spPr>
         <p:txBody>
@@ -3010,19 +3010,19 @@
               <a:rPr lang="pt-BR" dirty="0">
                 <a:latin typeface="Bell MT" panose="02020503060305020303" pitchFamily="18" charset="0"/>
               </a:rPr>
-              <a:t>Como realizar um completo teste de correlação de </a:t>
+              <a:t>Como realizar um completo teste de correlação de Pearson para n variáveis de forma </a:t>
             </a:r>
             <a:r>
               <a:rPr lang="pt-BR" dirty="0" err="1">
                 <a:latin typeface="Bell MT" panose="02020503060305020303" pitchFamily="18" charset="0"/>
               </a:rPr>
-              <a:t>person</a:t>
+              <a:t>semi</a:t>
             </a:r>
             <a:r>
               <a:rPr lang="pt-BR" dirty="0">
                 <a:latin typeface="Bell MT" panose="02020503060305020303" pitchFamily="18" charset="0"/>
               </a:rPr>
-              <a:t> para um número infinito de variáveis</a:t>
+              <a:t> automatizada</a:t>
             </a:r>
           </a:p>
         </p:txBody>
@@ -3556,39 +3556,44 @@
             <p:ph type="title"/>
           </p:nvPr>
         </p:nvSpPr>
-        <p:spPr/>
-        <p:txBody>
-          <a:bodyPr/>
-          <a:lstStyle/>
-          <a:p>
-            <a:r>
-              <a:rPr lang="pt-BR" b="1" dirty="0">
-                <a:latin typeface="Bell MT" panose="02020503060305020303" pitchFamily="18" charset="0"/>
-              </a:rPr>
-              <a:t>Vantagens e desvantagens</a:t>
-            </a:r>
-          </a:p>
-        </p:txBody>
-      </p:sp>
-      <p:sp>
-        <p:nvSpPr>
-          <p:cNvPr id="3" name="Espaço Reservado para Conteúdo 2"/>
-          <p:cNvSpPr>
-            <a:spLocks noGrp="1"/>
-          </p:cNvSpPr>
-          <p:nvPr>
-            <p:ph idx="1"/>
-          </p:nvPr>
-        </p:nvSpPr>
         <p:spPr>
           <a:xfrm>
-            <a:off x="838200" y="1825625"/>
-            <a:ext cx="10515600" cy="4826966"/>
+            <a:off x="838200" y="185014"/>
+            <a:ext cx="10515600" cy="1325563"/>
           </a:xfrm>
         </p:spPr>
         <p:txBody>
+          <a:bodyPr/>
+          <a:lstStyle/>
+          <a:p>
+            <a:r>
+              <a:rPr lang="pt-BR" b="1" dirty="0">
+                <a:latin typeface="Bell MT" panose="02020503060305020303" pitchFamily="18" charset="0"/>
+              </a:rPr>
+              <a:t>Vantagens e desvantagens</a:t>
+            </a:r>
+          </a:p>
+        </p:txBody>
+      </p:sp>
+      <p:sp>
+        <p:nvSpPr>
+          <p:cNvPr id="3" name="Espaço Reservado para Conteúdo 2"/>
+          <p:cNvSpPr>
+            <a:spLocks noGrp="1"/>
+          </p:cNvSpPr>
+          <p:nvPr>
+            <p:ph idx="1"/>
+          </p:nvPr>
+        </p:nvSpPr>
+        <p:spPr>
+          <a:xfrm>
+            <a:off x="838199" y="1548528"/>
+            <a:ext cx="10716491" cy="5124457"/>
+          </a:xfrm>
+        </p:spPr>
+        <p:txBody>
           <a:bodyPr>
-            <a:normAutofit fontScale="77500" lnSpcReduction="20000"/>
+            <a:normAutofit fontScale="85000" lnSpcReduction="20000"/>
           </a:bodyPr>
           <a:lstStyle/>
           <a:p>
@@ -3600,7 +3605,7 @@
               <a:rPr lang="pt-BR" b="1" dirty="0">
                 <a:latin typeface="Bell MT" panose="02020503060305020303" pitchFamily="18" charset="0"/>
               </a:rPr>
-              <a:t>A parte chata para isso será:</a:t>
+              <a:t>A parte “chata” para isso será:</a:t>
             </a:r>
           </a:p>
           <a:p>
@@ -3889,7 +3894,7 @@
         </p:nvSpPr>
         <p:spPr>
           <a:xfrm>
-            <a:off x="838200" y="1825625"/>
+            <a:off x="838200" y="1603949"/>
             <a:ext cx="10515600" cy="4826966"/>
           </a:xfrm>
         </p:spPr>
@@ -4066,7 +4071,7 @@
               <a:rPr lang="pt-BR" b="1" dirty="0" err="1">
                 <a:latin typeface="Bell MT" panose="02020503060305020303" pitchFamily="18" charset="0"/>
               </a:rPr>
-              <a:t>corrplo</a:t>
+              <a:t>corrplot</a:t>
             </a:r>
             <a:endParaRPr lang="pt-BR" b="1" dirty="0">
               <a:latin typeface="Bell MT" panose="02020503060305020303" pitchFamily="18" charset="0"/>
@@ -4083,27 +4088,6 @@
               </a:rPr>
               <a:t>Organizar os dados</a:t>
             </a:r>
-          </a:p>
-          <a:p>
-            <a:pPr marL="971550" lvl="1" indent="-514350">
-              <a:buFont typeface="+mj-lt"/>
-              <a:buAutoNum type="arabicPeriod"/>
-            </a:pPr>
-            <a:r>
-              <a:rPr lang="pt-BR" b="1" dirty="0">
-                <a:latin typeface="Bell MT" panose="02020503060305020303" pitchFamily="18" charset="0"/>
-              </a:rPr>
-              <a:t>Em formato .</a:t>
-            </a:r>
-            <a:r>
-              <a:rPr lang="pt-BR" b="1" dirty="0" err="1">
-                <a:latin typeface="Bell MT" panose="02020503060305020303" pitchFamily="18" charset="0"/>
-              </a:rPr>
-              <a:t>csv</a:t>
-            </a:r>
-            <a:endParaRPr lang="pt-BR" b="1" dirty="0">
-              <a:latin typeface="Bell MT" panose="02020503060305020303" pitchFamily="18" charset="0"/>
-            </a:endParaRPr>
           </a:p>
           <a:p>
             <a:pPr marL="971550" lvl="1" indent="-514350">
@@ -4195,7 +4179,7 @@
         <p:spPr/>
         <p:txBody>
           <a:bodyPr>
-            <a:normAutofit lnSpcReduction="10000"/>
+            <a:normAutofit/>
           </a:bodyPr>
           <a:lstStyle/>
           <a:p>
@@ -4243,7 +4227,7 @@
               <a:rPr lang="pt-BR" dirty="0">
                 <a:latin typeface="Bell MT" panose="02020503060305020303" pitchFamily="18" charset="0"/>
               </a:rPr>
-              <a:t>Indique onde os arquivos </a:t>
+              <a:t>Indique o diretório de trabalho onde o arquivo </a:t>
             </a:r>
             <a:r>
               <a:rPr lang="pt-BR" dirty="0" err="1">
@@ -4255,19 +4239,7 @@
               <a:rPr lang="pt-BR" dirty="0">
                 <a:latin typeface="Bell MT" panose="02020503060305020303" pitchFamily="18" charset="0"/>
               </a:rPr>
-              <a:t> </a:t>
-            </a:r>
-            <a:r>
-              <a:rPr lang="pt-BR" dirty="0" err="1">
-                <a:latin typeface="Bell MT" panose="02020503060305020303" pitchFamily="18" charset="0"/>
-              </a:rPr>
-              <a:t>csv</a:t>
-            </a:r>
-            <a:r>
-              <a:rPr lang="pt-BR" dirty="0">
-                <a:latin typeface="Bell MT" panose="02020503060305020303" pitchFamily="18" charset="0"/>
-              </a:rPr>
-              <a:t> se encontram (dois locais no script)</a:t>
+              <a:t> se encontra</a:t>
             </a:r>
           </a:p>
           <a:p>
@@ -4291,28 +4263,7 @@
               <a:rPr lang="pt-BR" dirty="0">
                 <a:latin typeface="Bell MT" panose="02020503060305020303" pitchFamily="18" charset="0"/>
               </a:rPr>
-              <a:t> e .</a:t>
-            </a:r>
-            <a:r>
-              <a:rPr lang="pt-BR" dirty="0" err="1">
-                <a:latin typeface="Bell MT" panose="02020503060305020303" pitchFamily="18" charset="0"/>
-              </a:rPr>
-              <a:t>csv</a:t>
-            </a:r>
-            <a:endParaRPr lang="pt-BR" dirty="0">
-              <a:latin typeface="Bell MT" panose="02020503060305020303" pitchFamily="18" charset="0"/>
-            </a:endParaRPr>
-          </a:p>
-          <a:p>
-            <a:pPr marL="971550" lvl="1" indent="-514350">
-              <a:buFont typeface="+mj-lt"/>
-              <a:buAutoNum type="arabicPeriod"/>
-            </a:pPr>
-            <a:r>
-              <a:rPr lang="pt-BR" dirty="0">
-                <a:latin typeface="Bell MT" panose="02020503060305020303" pitchFamily="18" charset="0"/>
-              </a:rPr>
-              <a:t>o nome da planilha do arquivo</a:t>
+              <a:t> e da planilha onde será encontrado os dados</a:t>
             </a:r>
           </a:p>
           <a:p>

</xml_diff>